<commit_message>
Jennifers deel presentatie toegevoegd
Never gonna give you up, never gonna let you down, desert you
</commit_message>
<xml_diff>
--- a/Project/Presentatie_En_UI/StartPresentatieXeroderma.pptx
+++ b/Project/Presentatie_En_UI/StartPresentatieXeroderma.pptx
@@ -6098,6 +6098,13 @@
   <p:clrMapOvr>
     <a:masterClrMapping/>
   </p:clrMapOvr>
+  <p:timing>
+    <p:tnLst>
+      <p:par>
+        <p:cTn id="1" dur="indefinite" restart="never" nodeType="tmRoot"/>
+      </p:par>
+    </p:tnLst>
+  </p:timing>
 </p:sld>
 </file>
 
@@ -6153,7 +6160,12 @@
             <p:ph idx="1"/>
           </p:nvPr>
         </p:nvSpPr>
-        <p:spPr/>
+        <p:spPr>
+          <a:xfrm>
+            <a:off x="762000" y="1524000"/>
+            <a:ext cx="7239000" cy="4724400"/>
+          </a:xfrm>
+        </p:spPr>
         <p:txBody>
           <a:bodyPr>
             <a:normAutofit fontScale="62500" lnSpcReduction="20000"/>
@@ -6241,8 +6253,26 @@
             </a:r>
             <a:r>
               <a:rPr lang="en-US" sz="2800" dirty="0"/>
-              <a:t>: User experience</a:t>
-            </a:r>
+              <a:t>: User </a:t>
+            </a:r>
+            <a:r>
+              <a:rPr lang="en-US" sz="2800" dirty="0" smtClean="0"/>
+              <a:t>experience</a:t>
+            </a:r>
+          </a:p>
+          <a:p>
+            <a:pPr>
+              <a:lnSpc>
+                <a:spcPct val="250000"/>
+              </a:lnSpc>
+              <a:buFont typeface="Wingdings" panose="05000000000000000000" pitchFamily="2" charset="2"/>
+              <a:buChar char="§"/>
+            </a:pPr>
+            <a:r>
+              <a:rPr lang="en-US" sz="2800" dirty="0" smtClean="0"/>
+              <a:t>Jennifer: Planning manager</a:t>
+            </a:r>
+            <a:endParaRPr lang="en-US" sz="2800" dirty="0"/>
           </a:p>
           <a:p>
             <a:endParaRPr lang="en-US" dirty="0"/>
@@ -6259,6 +6289,13 @@
   <p:clrMapOvr>
     <a:masterClrMapping/>
   </p:clrMapOvr>
+  <p:timing>
+    <p:tnLst>
+      <p:par>
+        <p:cTn id="1" dur="indefinite" restart="never" nodeType="tmRoot"/>
+      </p:par>
+    </p:tnLst>
+  </p:timing>
 </p:sld>
 </file>
 
@@ -6320,9 +6357,16 @@
             <p:ph idx="1"/>
           </p:nvPr>
         </p:nvSpPr>
-        <p:spPr/>
-        <p:txBody>
-          <a:bodyPr/>
+        <p:spPr>
+          <a:xfrm>
+            <a:off x="9144000" y="1270000"/>
+            <a:ext cx="3817503" cy="5410200"/>
+          </a:xfrm>
+        </p:spPr>
+        <p:txBody>
+          <a:bodyPr>
+            <a:normAutofit/>
+          </a:bodyPr>
           <a:lstStyle/>
           <a:p>
             <a:pPr marL="0" indent="0">
@@ -6346,20 +6390,12 @@
               <a:buNone/>
             </a:pPr>
             <a:r>
-              <a:rPr lang="nl-NL" dirty="0" err="1"/>
+              <a:rPr lang="nl-NL" dirty="0" err="1" smtClean="0"/>
               <a:t>Bloodborne</a:t>
             </a:r>
             <a:r>
-              <a:rPr lang="nl-NL" dirty="0"/>
+              <a:rPr lang="nl-NL" dirty="0" smtClean="0"/>
               <a:t>/AC </a:t>
-            </a:r>
-            <a:r>
-              <a:rPr lang="nl-NL" dirty="0" err="1"/>
-              <a:t>creed</a:t>
-            </a:r>
-            <a:r>
-              <a:rPr lang="nl-NL" dirty="0"/>
-              <a:t> </a:t>
             </a:r>
             <a:r>
               <a:rPr lang="nl-NL" dirty="0" err="1"/>
@@ -6372,12 +6408,197 @@
               <a:buNone/>
             </a:pPr>
             <a:r>
-              <a:rPr lang="nl-NL" dirty="0"/>
-              <a:t>1900</a:t>
-            </a:r>
-          </a:p>
-        </p:txBody>
-      </p:sp>
+              <a:rPr lang="nl-NL" dirty="0" smtClean="0"/>
+              <a:t>London rond 1850</a:t>
+            </a:r>
+          </a:p>
+          <a:p>
+            <a:pPr marL="0" indent="0">
+              <a:buNone/>
+            </a:pPr>
+            <a:r>
+              <a:rPr lang="en-US" dirty="0" smtClean="0"/>
+              <a:t>[</a:t>
+            </a:r>
+            <a:r>
+              <a:rPr lang="en-US" dirty="0" err="1" smtClean="0"/>
+              <a:t>Xeroderma</a:t>
+            </a:r>
+            <a:r>
+              <a:rPr lang="en-US" dirty="0" smtClean="0"/>
+              <a:t> is </a:t>
+            </a:r>
+            <a:r>
+              <a:rPr lang="en-US" dirty="0" err="1" smtClean="0"/>
+              <a:t>een</a:t>
+            </a:r>
+            <a:r>
+              <a:rPr lang="en-US" dirty="0" smtClean="0"/>
+              <a:t> 2.5D </a:t>
+            </a:r>
+            <a:r>
+              <a:rPr lang="en-US" dirty="0" err="1" smtClean="0"/>
+              <a:t>sidescrolling</a:t>
+            </a:r>
+            <a:r>
+              <a:rPr lang="en-US" dirty="0" smtClean="0"/>
+              <a:t> game </a:t>
+            </a:r>
+            <a:r>
+              <a:rPr lang="en-US" dirty="0" err="1" smtClean="0"/>
+              <a:t>dat</a:t>
+            </a:r>
+            <a:r>
+              <a:rPr lang="en-US" dirty="0" smtClean="0"/>
+              <a:t> </a:t>
+            </a:r>
+            <a:r>
+              <a:rPr lang="en-US" dirty="0" err="1" smtClean="0"/>
+              <a:t>zich</a:t>
+            </a:r>
+            <a:r>
+              <a:rPr lang="en-US" dirty="0" smtClean="0"/>
+              <a:t> </a:t>
+            </a:r>
+            <a:r>
+              <a:rPr lang="en-US" dirty="0" err="1" smtClean="0"/>
+              <a:t>afspeelt</a:t>
+            </a:r>
+            <a:r>
+              <a:rPr lang="en-US" dirty="0" smtClean="0"/>
+              <a:t> in </a:t>
+            </a:r>
+            <a:r>
+              <a:rPr lang="en-US" dirty="0" err="1" smtClean="0"/>
+              <a:t>stad</a:t>
+            </a:r>
+            <a:r>
+              <a:rPr lang="en-US" dirty="0" smtClean="0"/>
+              <a:t> London </a:t>
+            </a:r>
+            <a:r>
+              <a:rPr lang="en-US" dirty="0" err="1" smtClean="0"/>
+              <a:t>rond</a:t>
+            </a:r>
+            <a:r>
+              <a:rPr lang="en-US" dirty="0" smtClean="0"/>
+              <a:t> 1850. </a:t>
+            </a:r>
+            <a:endParaRPr lang="en-US" dirty="0"/>
+          </a:p>
+          <a:p>
+            <a:pPr marL="0" indent="0">
+              <a:buNone/>
+            </a:pPr>
+            <a:r>
+              <a:rPr lang="en-US" dirty="0" smtClean="0"/>
+              <a:t>In de game </a:t>
+            </a:r>
+            <a:r>
+              <a:rPr lang="en-US" dirty="0" err="1" smtClean="0"/>
+              <a:t>speel</a:t>
+            </a:r>
+            <a:r>
+              <a:rPr lang="en-US" dirty="0" smtClean="0"/>
+              <a:t> je </a:t>
+            </a:r>
+            <a:r>
+              <a:rPr lang="en-US" dirty="0" err="1" smtClean="0"/>
+              <a:t>als</a:t>
+            </a:r>
+            <a:r>
+              <a:rPr lang="en-US" dirty="0" smtClean="0"/>
+              <a:t> [Name] </a:t>
+            </a:r>
+            <a:br>
+              <a:rPr lang="en-US" dirty="0" smtClean="0"/>
+            </a:br>
+            <a:r>
+              <a:rPr lang="en-US" dirty="0" smtClean="0"/>
+              <a:t>die </a:t>
+            </a:r>
+            <a:r>
+              <a:rPr lang="en-US" dirty="0" err="1" smtClean="0"/>
+              <a:t>als</a:t>
+            </a:r>
+            <a:r>
+              <a:rPr lang="en-US" dirty="0" smtClean="0"/>
+              <a:t> </a:t>
+            </a:r>
+            <a:r>
+              <a:rPr lang="en-US" dirty="0" err="1" smtClean="0"/>
+              <a:t>levensbron</a:t>
+            </a:r>
+            <a:r>
+              <a:rPr lang="en-US" dirty="0" smtClean="0"/>
+              <a:t> </a:t>
+            </a:r>
+            <a:r>
+              <a:rPr lang="en-US" dirty="0" err="1" smtClean="0"/>
+              <a:t>bloed</a:t>
+            </a:r>
+            <a:r>
+              <a:rPr lang="en-US" dirty="0" smtClean="0"/>
+              <a:t> </a:t>
+            </a:r>
+            <a:r>
+              <a:rPr lang="en-US" dirty="0" err="1" smtClean="0"/>
+              <a:t>gebruikt</a:t>
+            </a:r>
+            <a:r>
+              <a:rPr lang="en-US" dirty="0" smtClean="0"/>
+              <a:t>.]</a:t>
+            </a:r>
+          </a:p>
+          <a:p>
+            <a:pPr marL="0" indent="0">
+              <a:buNone/>
+            </a:pPr>
+            <a:endParaRPr lang="en-US" dirty="0" smtClean="0"/>
+          </a:p>
+        </p:txBody>
+      </p:sp>
+      <p:pic>
+        <p:nvPicPr>
+          <p:cNvPr id="1028" name="Picture 4" descr="Afbeeldingsresultaat voor london 1850"/>
+          <p:cNvPicPr>
+            <a:picLocks noChangeAspect="1" noChangeArrowheads="1"/>
+          </p:cNvPicPr>
+          <p:nvPr/>
+        </p:nvPicPr>
+        <p:blipFill>
+          <a:blip r:embed="rId2">
+            <a:extLst>
+              <a:ext uri="{28A0092B-C50C-407E-A947-70E740481C1C}">
+                <a14:useLocalDpi xmlns:a14="http://schemas.microsoft.com/office/drawing/2010/main" val="0"/>
+              </a:ext>
+            </a:extLst>
+          </a:blip>
+          <a:srcRect/>
+          <a:stretch>
+            <a:fillRect/>
+          </a:stretch>
+        </p:blipFill>
+        <p:spPr bwMode="auto">
+          <a:xfrm>
+            <a:off x="304800" y="1466850"/>
+            <a:ext cx="6775006" cy="4340771"/>
+          </a:xfrm>
+          <a:prstGeom prst="rect">
+            <a:avLst/>
+          </a:prstGeom>
+          <a:noFill/>
+          <a:extLst>
+            <a:ext uri="{909E8E84-426E-40DD-AFC4-6F175D3DCCD1}">
+              <a14:hiddenFill xmlns:a14="http://schemas.microsoft.com/office/drawing/2010/main">
+                <a:solidFill>
+                  <a:srgbClr val="FFFFFF"/>
+                </a:solidFill>
+              </a14:hiddenFill>
+            </a:ext>
+          </a:extLst>
+        </p:spPr>
+      </p:pic>
     </p:spTree>
     <p:extLst>
       <p:ext uri="{BB962C8B-B14F-4D97-AF65-F5344CB8AC3E}">
@@ -6388,6 +6609,13 @@
   <p:clrMapOvr>
     <a:masterClrMapping/>
   </p:clrMapOvr>
+  <p:timing>
+    <p:tnLst>
+      <p:par>
+        <p:cTn id="1" dur="indefinite" restart="never" nodeType="tmRoot"/>
+      </p:par>
+    </p:tnLst>
+  </p:timing>
 </p:sld>
 </file>
 
@@ -6514,6 +6742,13 @@
   <p:clrMapOvr>
     <a:masterClrMapping/>
   </p:clrMapOvr>
+  <p:timing>
+    <p:tnLst>
+      <p:par>
+        <p:cTn id="1" dur="indefinite" restart="never" nodeType="tmRoot"/>
+      </p:par>
+    </p:tnLst>
+  </p:timing>
 </p:sld>
 </file>
 
@@ -6556,25 +6791,154 @@
           </a:p>
         </p:txBody>
       </p:sp>
-      <p:sp>
-        <p:nvSpPr>
-          <p:cNvPr id="3" name="Tijdelijke aanduiding voor inhoud 2"/>
-          <p:cNvSpPr>
-            <a:spLocks noGrp="1"/>
-          </p:cNvSpPr>
+      <p:pic>
+        <p:nvPicPr>
+          <p:cNvPr id="4" name="Tijdelijke aanduiding voor inhoud 3"/>
+          <p:cNvPicPr>
+            <a:picLocks noGrp="1" noChangeAspect="1"/>
+          </p:cNvPicPr>
           <p:nvPr>
             <p:ph idx="1"/>
           </p:nvPr>
-        </p:nvSpPr>
-        <p:spPr/>
-        <p:txBody>
-          <a:bodyPr/>
-          <a:lstStyle/>
-          <a:p>
-            <a:endParaRPr lang="nl-NL"/>
-          </a:p>
-        </p:txBody>
-      </p:sp>
+        </p:nvPicPr>
+        <p:blipFill>
+          <a:blip r:embed="rId2" cstate="print">
+            <a:extLst>
+              <a:ext uri="{28A0092B-C50C-407E-A947-70E740481C1C}">
+                <a14:useLocalDpi xmlns:a14="http://schemas.microsoft.com/office/drawing/2010/main" val="0"/>
+              </a:ext>
+            </a:extLst>
+          </a:blip>
+          <a:stretch>
+            <a:fillRect/>
+          </a:stretch>
+        </p:blipFill>
+        <p:spPr>
+          <a:xfrm>
+            <a:off x="225220" y="1270000"/>
+            <a:ext cx="8809558" cy="4148138"/>
+          </a:xfrm>
+        </p:spPr>
+      </p:pic>
+      <p:pic>
+        <p:nvPicPr>
+          <p:cNvPr id="5" name="Afbeelding 4"/>
+          <p:cNvPicPr>
+            <a:picLocks noChangeAspect="1"/>
+          </p:cNvPicPr>
+          <p:nvPr/>
+        </p:nvPicPr>
+        <p:blipFill>
+          <a:blip r:embed="rId3">
+            <a:extLst>
+              <a:ext uri="{28A0092B-C50C-407E-A947-70E740481C1C}">
+                <a14:useLocalDpi xmlns:a14="http://schemas.microsoft.com/office/drawing/2010/main" val="0"/>
+              </a:ext>
+            </a:extLst>
+          </a:blip>
+          <a:stretch>
+            <a:fillRect/>
+          </a:stretch>
+        </p:blipFill>
+        <p:spPr>
+          <a:xfrm>
+            <a:off x="225220" y="1270000"/>
+            <a:ext cx="2651990" cy="3894157"/>
+          </a:xfrm>
+          <a:prstGeom prst="rect">
+            <a:avLst/>
+          </a:prstGeom>
+        </p:spPr>
+      </p:pic>
+      <p:pic>
+        <p:nvPicPr>
+          <p:cNvPr id="6" name="Afbeelding 5"/>
+          <p:cNvPicPr>
+            <a:picLocks noChangeAspect="1"/>
+          </p:cNvPicPr>
+          <p:nvPr/>
+        </p:nvPicPr>
+        <p:blipFill rotWithShape="1">
+          <a:blip r:embed="rId4">
+            <a:extLst>
+              <a:ext uri="{28A0092B-C50C-407E-A947-70E740481C1C}">
+                <a14:useLocalDpi xmlns:a14="http://schemas.microsoft.com/office/drawing/2010/main" val="0"/>
+              </a:ext>
+            </a:extLst>
+          </a:blip>
+          <a:srcRect l="-687" t="72" r="2308" b="-72"/>
+          <a:stretch/>
+        </p:blipFill>
+        <p:spPr>
+          <a:xfrm>
+            <a:off x="4629999" y="1298575"/>
+            <a:ext cx="2609001" cy="4416425"/>
+          </a:xfrm>
+          <a:prstGeom prst="rect">
+            <a:avLst/>
+          </a:prstGeom>
+        </p:spPr>
+      </p:pic>
+      <p:pic>
+        <p:nvPicPr>
+          <p:cNvPr id="7" name="Afbeelding 6"/>
+          <p:cNvPicPr>
+            <a:picLocks noChangeAspect="1"/>
+          </p:cNvPicPr>
+          <p:nvPr/>
+        </p:nvPicPr>
+        <p:blipFill>
+          <a:blip r:embed="rId5">
+            <a:extLst>
+              <a:ext uri="{28A0092B-C50C-407E-A947-70E740481C1C}">
+                <a14:useLocalDpi xmlns:a14="http://schemas.microsoft.com/office/drawing/2010/main" val="0"/>
+              </a:ext>
+            </a:extLst>
+          </a:blip>
+          <a:stretch>
+            <a:fillRect/>
+          </a:stretch>
+        </p:blipFill>
+        <p:spPr>
+          <a:xfrm>
+            <a:off x="225220" y="1270000"/>
+            <a:ext cx="5681973" cy="5132538"/>
+          </a:xfrm>
+          <a:prstGeom prst="rect">
+            <a:avLst/>
+          </a:prstGeom>
+        </p:spPr>
+      </p:pic>
+      <p:pic>
+        <p:nvPicPr>
+          <p:cNvPr id="8" name="Afbeelding 7"/>
+          <p:cNvPicPr>
+            <a:picLocks noChangeAspect="1"/>
+          </p:cNvPicPr>
+          <p:nvPr/>
+        </p:nvPicPr>
+        <p:blipFill>
+          <a:blip r:embed="rId6">
+            <a:extLst>
+              <a:ext uri="{28A0092B-C50C-407E-A947-70E740481C1C}">
+                <a14:useLocalDpi xmlns:a14="http://schemas.microsoft.com/office/drawing/2010/main" val="0"/>
+              </a:ext>
+            </a:extLst>
+          </a:blip>
+          <a:stretch>
+            <a:fillRect/>
+          </a:stretch>
+        </p:blipFill>
+        <p:spPr>
+          <a:xfrm>
+            <a:off x="5907193" y="1270000"/>
+            <a:ext cx="3221467" cy="934623"/>
+          </a:xfrm>
+          <a:prstGeom prst="rect">
+            <a:avLst/>
+          </a:prstGeom>
+        </p:spPr>
+      </p:pic>
     </p:spTree>
     <p:extLst>
       <p:ext uri="{BB962C8B-B14F-4D97-AF65-F5344CB8AC3E}">
@@ -6585,6 +6949,248 @@
   <p:clrMapOvr>
     <a:masterClrMapping/>
   </p:clrMapOvr>
+  <p:timing>
+    <p:tnLst>
+      <p:par>
+        <p:cTn id="1" dur="indefinite" restart="never" nodeType="tmRoot">
+          <p:childTnLst>
+            <p:seq concurrent="1" nextAc="seek">
+              <p:cTn id="2" dur="indefinite" nodeType="mainSeq">
+                <p:childTnLst>
+                  <p:par>
+                    <p:cTn id="3" fill="hold">
+                      <p:stCondLst>
+                        <p:cond delay="indefinite"/>
+                      </p:stCondLst>
+                      <p:childTnLst>
+                        <p:par>
+                          <p:cTn id="4" fill="hold">
+                            <p:stCondLst>
+                              <p:cond delay="0"/>
+                            </p:stCondLst>
+                            <p:childTnLst>
+                              <p:par>
+                                <p:cTn id="5" presetID="10" presetClass="entr" presetSubtype="0" fill="hold" nodeType="clickEffect">
+                                  <p:stCondLst>
+                                    <p:cond delay="0"/>
+                                  </p:stCondLst>
+                                  <p:childTnLst>
+                                    <p:set>
+                                      <p:cBhvr>
+                                        <p:cTn id="6" dur="1" fill="hold">
+                                          <p:stCondLst>
+                                            <p:cond delay="0"/>
+                                          </p:stCondLst>
+                                        </p:cTn>
+                                        <p:tgtEl>
+                                          <p:spTgt spid="5"/>
+                                        </p:tgtEl>
+                                        <p:attrNameLst>
+                                          <p:attrName>style.visibility</p:attrName>
+                                        </p:attrNameLst>
+                                      </p:cBhvr>
+                                      <p:to>
+                                        <p:strVal val="visible"/>
+                                      </p:to>
+                                    </p:set>
+                                    <p:animEffect transition="in" filter="fade">
+                                      <p:cBhvr>
+                                        <p:cTn id="7" dur="500"/>
+                                        <p:tgtEl>
+                                          <p:spTgt spid="5"/>
+                                        </p:tgtEl>
+                                      </p:cBhvr>
+                                    </p:animEffect>
+                                  </p:childTnLst>
+                                </p:cTn>
+                              </p:par>
+                            </p:childTnLst>
+                          </p:cTn>
+                        </p:par>
+                      </p:childTnLst>
+                    </p:cTn>
+                  </p:par>
+                  <p:par>
+                    <p:cTn id="8" fill="hold">
+                      <p:stCondLst>
+                        <p:cond delay="indefinite"/>
+                      </p:stCondLst>
+                      <p:childTnLst>
+                        <p:par>
+                          <p:cTn id="9" fill="hold">
+                            <p:stCondLst>
+                              <p:cond delay="0"/>
+                            </p:stCondLst>
+                            <p:childTnLst>
+                              <p:par>
+                                <p:cTn id="10" presetID="10" presetClass="entr" presetSubtype="0" fill="hold" nodeType="clickEffect">
+                                  <p:stCondLst>
+                                    <p:cond delay="0"/>
+                                  </p:stCondLst>
+                                  <p:childTnLst>
+                                    <p:set>
+                                      <p:cBhvr>
+                                        <p:cTn id="11" dur="1" fill="hold">
+                                          <p:stCondLst>
+                                            <p:cond delay="0"/>
+                                          </p:stCondLst>
+                                        </p:cTn>
+                                        <p:tgtEl>
+                                          <p:spTgt spid="6"/>
+                                        </p:tgtEl>
+                                        <p:attrNameLst>
+                                          <p:attrName>style.visibility</p:attrName>
+                                        </p:attrNameLst>
+                                      </p:cBhvr>
+                                      <p:to>
+                                        <p:strVal val="visible"/>
+                                      </p:to>
+                                    </p:set>
+                                    <p:animEffect transition="in" filter="fade">
+                                      <p:cBhvr>
+                                        <p:cTn id="12" dur="500"/>
+                                        <p:tgtEl>
+                                          <p:spTgt spid="6"/>
+                                        </p:tgtEl>
+                                      </p:cBhvr>
+                                    </p:animEffect>
+                                  </p:childTnLst>
+                                </p:cTn>
+                              </p:par>
+                            </p:childTnLst>
+                          </p:cTn>
+                        </p:par>
+                      </p:childTnLst>
+                    </p:cTn>
+                  </p:par>
+                  <p:par>
+                    <p:cTn id="13" fill="hold">
+                      <p:stCondLst>
+                        <p:cond delay="indefinite"/>
+                      </p:stCondLst>
+                      <p:childTnLst>
+                        <p:par>
+                          <p:cTn id="14" fill="hold">
+                            <p:stCondLst>
+                              <p:cond delay="0"/>
+                            </p:stCondLst>
+                            <p:childTnLst>
+                              <p:par>
+                                <p:cTn id="15" presetID="10" presetClass="entr" presetSubtype="0" fill="hold" nodeType="clickEffect">
+                                  <p:stCondLst>
+                                    <p:cond delay="0"/>
+                                  </p:stCondLst>
+                                  <p:childTnLst>
+                                    <p:set>
+                                      <p:cBhvr>
+                                        <p:cTn id="16" dur="1" fill="hold">
+                                          <p:stCondLst>
+                                            <p:cond delay="0"/>
+                                          </p:stCondLst>
+                                        </p:cTn>
+                                        <p:tgtEl>
+                                          <p:spTgt spid="8"/>
+                                        </p:tgtEl>
+                                        <p:attrNameLst>
+                                          <p:attrName>style.visibility</p:attrName>
+                                        </p:attrNameLst>
+                                      </p:cBhvr>
+                                      <p:to>
+                                        <p:strVal val="visible"/>
+                                      </p:to>
+                                    </p:set>
+                                    <p:animEffect transition="in" filter="fade">
+                                      <p:cBhvr>
+                                        <p:cTn id="17" dur="500"/>
+                                        <p:tgtEl>
+                                          <p:spTgt spid="8"/>
+                                        </p:tgtEl>
+                                      </p:cBhvr>
+                                    </p:animEffect>
+                                  </p:childTnLst>
+                                </p:cTn>
+                              </p:par>
+                            </p:childTnLst>
+                          </p:cTn>
+                        </p:par>
+                      </p:childTnLst>
+                    </p:cTn>
+                  </p:par>
+                  <p:par>
+                    <p:cTn id="18" fill="hold">
+                      <p:stCondLst>
+                        <p:cond delay="indefinite"/>
+                      </p:stCondLst>
+                      <p:childTnLst>
+                        <p:par>
+                          <p:cTn id="19" fill="hold">
+                            <p:stCondLst>
+                              <p:cond delay="0"/>
+                            </p:stCondLst>
+                            <p:childTnLst>
+                              <p:par>
+                                <p:cTn id="20" presetID="10" presetClass="entr" presetSubtype="0" fill="hold" nodeType="clickEffect">
+                                  <p:stCondLst>
+                                    <p:cond delay="0"/>
+                                  </p:stCondLst>
+                                  <p:childTnLst>
+                                    <p:set>
+                                      <p:cBhvr>
+                                        <p:cTn id="21" dur="1" fill="hold">
+                                          <p:stCondLst>
+                                            <p:cond delay="0"/>
+                                          </p:stCondLst>
+                                        </p:cTn>
+                                        <p:tgtEl>
+                                          <p:spTgt spid="7"/>
+                                        </p:tgtEl>
+                                        <p:attrNameLst>
+                                          <p:attrName>style.visibility</p:attrName>
+                                        </p:attrNameLst>
+                                      </p:cBhvr>
+                                      <p:to>
+                                        <p:strVal val="visible"/>
+                                      </p:to>
+                                    </p:set>
+                                    <p:animEffect transition="in" filter="fade">
+                                      <p:cBhvr>
+                                        <p:cTn id="22" dur="500"/>
+                                        <p:tgtEl>
+                                          <p:spTgt spid="7"/>
+                                        </p:tgtEl>
+                                      </p:cBhvr>
+                                    </p:animEffect>
+                                  </p:childTnLst>
+                                </p:cTn>
+                              </p:par>
+                            </p:childTnLst>
+                          </p:cTn>
+                        </p:par>
+                      </p:childTnLst>
+                    </p:cTn>
+                  </p:par>
+                </p:childTnLst>
+              </p:cTn>
+              <p:prevCondLst>
+                <p:cond evt="onPrev" delay="0">
+                  <p:tgtEl>
+                    <p:sldTgt/>
+                  </p:tgtEl>
+                </p:cond>
+              </p:prevCondLst>
+              <p:nextCondLst>
+                <p:cond evt="onNext" delay="0">
+                  <p:tgtEl>
+                    <p:sldTgt/>
+                  </p:tgtEl>
+                </p:cond>
+              </p:nextCondLst>
+            </p:seq>
+          </p:childTnLst>
+        </p:cTn>
+      </p:par>
+    </p:tnLst>
+  </p:timing>
 </p:sld>
 </file>
 
@@ -6820,6 +7426,13 @@
   <p:clrMapOvr>
     <a:masterClrMapping/>
   </p:clrMapOvr>
+  <p:timing>
+    <p:tnLst>
+      <p:par>
+        <p:cTn id="1" dur="indefinite" restart="never" nodeType="tmRoot"/>
+      </p:par>
+    </p:tnLst>
+  </p:timing>
 </p:sld>
 </file>
 
@@ -6891,6 +7504,13 @@
   <p:clrMapOvr>
     <a:masterClrMapping/>
   </p:clrMapOvr>
+  <p:timing>
+    <p:tnLst>
+      <p:par>
+        <p:cTn id="1" dur="indefinite" restart="never" nodeType="tmRoot"/>
+      </p:par>
+    </p:tnLst>
+  </p:timing>
 </p:sld>
 </file>
 

</xml_diff>

<commit_message>
Revert "Jennifers deel presentatie toegevoegd"
This reverts commit 6fd32d28e031841fe74d97db0d0df45701bb8eb3.
</commit_message>
<xml_diff>
--- a/Project/Presentatie_En_UI/StartPresentatieXeroderma.pptx
+++ b/Project/Presentatie_En_UI/StartPresentatieXeroderma.pptx
@@ -6098,13 +6098,6 @@
   <p:clrMapOvr>
     <a:masterClrMapping/>
   </p:clrMapOvr>
-  <p:timing>
-    <p:tnLst>
-      <p:par>
-        <p:cTn id="1" dur="indefinite" restart="never" nodeType="tmRoot"/>
-      </p:par>
-    </p:tnLst>
-  </p:timing>
 </p:sld>
 </file>
 
@@ -6160,12 +6153,7 @@
             <p:ph idx="1"/>
           </p:nvPr>
         </p:nvSpPr>
-        <p:spPr>
-          <a:xfrm>
-            <a:off x="762000" y="1524000"/>
-            <a:ext cx="7239000" cy="4724400"/>
-          </a:xfrm>
-        </p:spPr>
+        <p:spPr/>
         <p:txBody>
           <a:bodyPr>
             <a:normAutofit fontScale="62500" lnSpcReduction="20000"/>
@@ -6253,26 +6241,8 @@
             </a:r>
             <a:r>
               <a:rPr lang="en-US" sz="2800" dirty="0"/>
-              <a:t>: User </a:t>
-            </a:r>
-            <a:r>
-              <a:rPr lang="en-US" sz="2800" dirty="0" smtClean="0"/>
-              <a:t>experience</a:t>
-            </a:r>
-          </a:p>
-          <a:p>
-            <a:pPr>
-              <a:lnSpc>
-                <a:spcPct val="250000"/>
-              </a:lnSpc>
-              <a:buFont typeface="Wingdings" panose="05000000000000000000" pitchFamily="2" charset="2"/>
-              <a:buChar char="§"/>
-            </a:pPr>
-            <a:r>
-              <a:rPr lang="en-US" sz="2800" dirty="0" smtClean="0"/>
-              <a:t>Jennifer: Planning manager</a:t>
-            </a:r>
-            <a:endParaRPr lang="en-US" sz="2800" dirty="0"/>
+              <a:t>: User experience</a:t>
+            </a:r>
           </a:p>
           <a:p>
             <a:endParaRPr lang="en-US" dirty="0"/>
@@ -6289,13 +6259,6 @@
   <p:clrMapOvr>
     <a:masterClrMapping/>
   </p:clrMapOvr>
-  <p:timing>
-    <p:tnLst>
-      <p:par>
-        <p:cTn id="1" dur="indefinite" restart="never" nodeType="tmRoot"/>
-      </p:par>
-    </p:tnLst>
-  </p:timing>
 </p:sld>
 </file>
 
@@ -6357,16 +6320,9 @@
             <p:ph idx="1"/>
           </p:nvPr>
         </p:nvSpPr>
-        <p:spPr>
-          <a:xfrm>
-            <a:off x="9144000" y="1270000"/>
-            <a:ext cx="3817503" cy="5410200"/>
-          </a:xfrm>
-        </p:spPr>
-        <p:txBody>
-          <a:bodyPr>
-            <a:normAutofit/>
-          </a:bodyPr>
+        <p:spPr/>
+        <p:txBody>
+          <a:bodyPr/>
           <a:lstStyle/>
           <a:p>
             <a:pPr marL="0" indent="0">
@@ -6390,12 +6346,20 @@
               <a:buNone/>
             </a:pPr>
             <a:r>
-              <a:rPr lang="nl-NL" dirty="0" err="1" smtClean="0"/>
+              <a:rPr lang="nl-NL" dirty="0" err="1"/>
               <a:t>Bloodborne</a:t>
             </a:r>
             <a:r>
-              <a:rPr lang="nl-NL" dirty="0" smtClean="0"/>
+              <a:rPr lang="nl-NL" dirty="0"/>
               <a:t>/AC </a:t>
+            </a:r>
+            <a:r>
+              <a:rPr lang="nl-NL" dirty="0" err="1"/>
+              <a:t>creed</a:t>
+            </a:r>
+            <a:r>
+              <a:rPr lang="nl-NL" dirty="0"/>
+              <a:t> </a:t>
             </a:r>
             <a:r>
               <a:rPr lang="nl-NL" dirty="0" err="1"/>
@@ -6408,197 +6372,12 @@
               <a:buNone/>
             </a:pPr>
             <a:r>
-              <a:rPr lang="nl-NL" dirty="0" smtClean="0"/>
-              <a:t>London rond 1850</a:t>
-            </a:r>
-          </a:p>
-          <a:p>
-            <a:pPr marL="0" indent="0">
-              <a:buNone/>
-            </a:pPr>
-            <a:r>
-              <a:rPr lang="en-US" dirty="0" smtClean="0"/>
-              <a:t>[</a:t>
-            </a:r>
-            <a:r>
-              <a:rPr lang="en-US" dirty="0" err="1" smtClean="0"/>
-              <a:t>Xeroderma</a:t>
-            </a:r>
-            <a:r>
-              <a:rPr lang="en-US" dirty="0" smtClean="0"/>
-              <a:t> is </a:t>
-            </a:r>
-            <a:r>
-              <a:rPr lang="en-US" dirty="0" err="1" smtClean="0"/>
-              <a:t>een</a:t>
-            </a:r>
-            <a:r>
-              <a:rPr lang="en-US" dirty="0" smtClean="0"/>
-              <a:t> 2.5D </a:t>
-            </a:r>
-            <a:r>
-              <a:rPr lang="en-US" dirty="0" err="1" smtClean="0"/>
-              <a:t>sidescrolling</a:t>
-            </a:r>
-            <a:r>
-              <a:rPr lang="en-US" dirty="0" smtClean="0"/>
-              <a:t> game </a:t>
-            </a:r>
-            <a:r>
-              <a:rPr lang="en-US" dirty="0" err="1" smtClean="0"/>
-              <a:t>dat</a:t>
-            </a:r>
-            <a:r>
-              <a:rPr lang="en-US" dirty="0" smtClean="0"/>
-              <a:t> </a:t>
-            </a:r>
-            <a:r>
-              <a:rPr lang="en-US" dirty="0" err="1" smtClean="0"/>
-              <a:t>zich</a:t>
-            </a:r>
-            <a:r>
-              <a:rPr lang="en-US" dirty="0" smtClean="0"/>
-              <a:t> </a:t>
-            </a:r>
-            <a:r>
-              <a:rPr lang="en-US" dirty="0" err="1" smtClean="0"/>
-              <a:t>afspeelt</a:t>
-            </a:r>
-            <a:r>
-              <a:rPr lang="en-US" dirty="0" smtClean="0"/>
-              <a:t> in </a:t>
-            </a:r>
-            <a:r>
-              <a:rPr lang="en-US" dirty="0" err="1" smtClean="0"/>
-              <a:t>stad</a:t>
-            </a:r>
-            <a:r>
-              <a:rPr lang="en-US" dirty="0" smtClean="0"/>
-              <a:t> London </a:t>
-            </a:r>
-            <a:r>
-              <a:rPr lang="en-US" dirty="0" err="1" smtClean="0"/>
-              <a:t>rond</a:t>
-            </a:r>
-            <a:r>
-              <a:rPr lang="en-US" dirty="0" smtClean="0"/>
-              <a:t> 1850. </a:t>
-            </a:r>
-            <a:endParaRPr lang="en-US" dirty="0"/>
-          </a:p>
-          <a:p>
-            <a:pPr marL="0" indent="0">
-              <a:buNone/>
-            </a:pPr>
-            <a:r>
-              <a:rPr lang="en-US" dirty="0" smtClean="0"/>
-              <a:t>In de game </a:t>
-            </a:r>
-            <a:r>
-              <a:rPr lang="en-US" dirty="0" err="1" smtClean="0"/>
-              <a:t>speel</a:t>
-            </a:r>
-            <a:r>
-              <a:rPr lang="en-US" dirty="0" smtClean="0"/>
-              <a:t> je </a:t>
-            </a:r>
-            <a:r>
-              <a:rPr lang="en-US" dirty="0" err="1" smtClean="0"/>
-              <a:t>als</a:t>
-            </a:r>
-            <a:r>
-              <a:rPr lang="en-US" dirty="0" smtClean="0"/>
-              <a:t> [Name] </a:t>
-            </a:r>
-            <a:br>
-              <a:rPr lang="en-US" dirty="0" smtClean="0"/>
-            </a:br>
-            <a:r>
-              <a:rPr lang="en-US" dirty="0" smtClean="0"/>
-              <a:t>die </a:t>
-            </a:r>
-            <a:r>
-              <a:rPr lang="en-US" dirty="0" err="1" smtClean="0"/>
-              <a:t>als</a:t>
-            </a:r>
-            <a:r>
-              <a:rPr lang="en-US" dirty="0" smtClean="0"/>
-              <a:t> </a:t>
-            </a:r>
-            <a:r>
-              <a:rPr lang="en-US" dirty="0" err="1" smtClean="0"/>
-              <a:t>levensbron</a:t>
-            </a:r>
-            <a:r>
-              <a:rPr lang="en-US" dirty="0" smtClean="0"/>
-              <a:t> </a:t>
-            </a:r>
-            <a:r>
-              <a:rPr lang="en-US" dirty="0" err="1" smtClean="0"/>
-              <a:t>bloed</a:t>
-            </a:r>
-            <a:r>
-              <a:rPr lang="en-US" dirty="0" smtClean="0"/>
-              <a:t> </a:t>
-            </a:r>
-            <a:r>
-              <a:rPr lang="en-US" dirty="0" err="1" smtClean="0"/>
-              <a:t>gebruikt</a:t>
-            </a:r>
-            <a:r>
-              <a:rPr lang="en-US" dirty="0" smtClean="0"/>
-              <a:t>.]</a:t>
-            </a:r>
-          </a:p>
-          <a:p>
-            <a:pPr marL="0" indent="0">
-              <a:buNone/>
-            </a:pPr>
-            <a:endParaRPr lang="en-US" dirty="0" smtClean="0"/>
-          </a:p>
-        </p:txBody>
-      </p:sp>
-      <p:pic>
-        <p:nvPicPr>
-          <p:cNvPr id="1028" name="Picture 4" descr="Afbeeldingsresultaat voor london 1850"/>
-          <p:cNvPicPr>
-            <a:picLocks noChangeAspect="1" noChangeArrowheads="1"/>
-          </p:cNvPicPr>
-          <p:nvPr/>
-        </p:nvPicPr>
-        <p:blipFill>
-          <a:blip r:embed="rId2">
-            <a:extLst>
-              <a:ext uri="{28A0092B-C50C-407E-A947-70E740481C1C}">
-                <a14:useLocalDpi xmlns:a14="http://schemas.microsoft.com/office/drawing/2010/main" val="0"/>
-              </a:ext>
-            </a:extLst>
-          </a:blip>
-          <a:srcRect/>
-          <a:stretch>
-            <a:fillRect/>
-          </a:stretch>
-        </p:blipFill>
-        <p:spPr bwMode="auto">
-          <a:xfrm>
-            <a:off x="304800" y="1466850"/>
-            <a:ext cx="6775006" cy="4340771"/>
-          </a:xfrm>
-          <a:prstGeom prst="rect">
-            <a:avLst/>
-          </a:prstGeom>
-          <a:noFill/>
-          <a:extLst>
-            <a:ext uri="{909E8E84-426E-40DD-AFC4-6F175D3DCCD1}">
-              <a14:hiddenFill xmlns:a14="http://schemas.microsoft.com/office/drawing/2010/main">
-                <a:solidFill>
-                  <a:srgbClr val="FFFFFF"/>
-                </a:solidFill>
-              </a14:hiddenFill>
-            </a:ext>
-          </a:extLst>
-        </p:spPr>
-      </p:pic>
+              <a:rPr lang="nl-NL" dirty="0"/>
+              <a:t>1900</a:t>
+            </a:r>
+          </a:p>
+        </p:txBody>
+      </p:sp>
     </p:spTree>
     <p:extLst>
       <p:ext uri="{BB962C8B-B14F-4D97-AF65-F5344CB8AC3E}">
@@ -6609,13 +6388,6 @@
   <p:clrMapOvr>
     <a:masterClrMapping/>
   </p:clrMapOvr>
-  <p:timing>
-    <p:tnLst>
-      <p:par>
-        <p:cTn id="1" dur="indefinite" restart="never" nodeType="tmRoot"/>
-      </p:par>
-    </p:tnLst>
-  </p:timing>
 </p:sld>
 </file>
 
@@ -6742,13 +6514,6 @@
   <p:clrMapOvr>
     <a:masterClrMapping/>
   </p:clrMapOvr>
-  <p:timing>
-    <p:tnLst>
-      <p:par>
-        <p:cTn id="1" dur="indefinite" restart="never" nodeType="tmRoot"/>
-      </p:par>
-    </p:tnLst>
-  </p:timing>
 </p:sld>
 </file>
 
@@ -6791,154 +6556,25 @@
           </a:p>
         </p:txBody>
       </p:sp>
-      <p:pic>
-        <p:nvPicPr>
-          <p:cNvPr id="4" name="Tijdelijke aanduiding voor inhoud 3"/>
-          <p:cNvPicPr>
-            <a:picLocks noGrp="1" noChangeAspect="1"/>
-          </p:cNvPicPr>
+      <p:sp>
+        <p:nvSpPr>
+          <p:cNvPr id="3" name="Tijdelijke aanduiding voor inhoud 2"/>
+          <p:cNvSpPr>
+            <a:spLocks noGrp="1"/>
+          </p:cNvSpPr>
           <p:nvPr>
             <p:ph idx="1"/>
           </p:nvPr>
-        </p:nvPicPr>
-        <p:blipFill>
-          <a:blip r:embed="rId2" cstate="print">
-            <a:extLst>
-              <a:ext uri="{28A0092B-C50C-407E-A947-70E740481C1C}">
-                <a14:useLocalDpi xmlns:a14="http://schemas.microsoft.com/office/drawing/2010/main" val="0"/>
-              </a:ext>
-            </a:extLst>
-          </a:blip>
-          <a:stretch>
-            <a:fillRect/>
-          </a:stretch>
-        </p:blipFill>
-        <p:spPr>
-          <a:xfrm>
-            <a:off x="225220" y="1270000"/>
-            <a:ext cx="8809558" cy="4148138"/>
-          </a:xfrm>
-        </p:spPr>
-      </p:pic>
-      <p:pic>
-        <p:nvPicPr>
-          <p:cNvPr id="5" name="Afbeelding 4"/>
-          <p:cNvPicPr>
-            <a:picLocks noChangeAspect="1"/>
-          </p:cNvPicPr>
-          <p:nvPr/>
-        </p:nvPicPr>
-        <p:blipFill>
-          <a:blip r:embed="rId3">
-            <a:extLst>
-              <a:ext uri="{28A0092B-C50C-407E-A947-70E740481C1C}">
-                <a14:useLocalDpi xmlns:a14="http://schemas.microsoft.com/office/drawing/2010/main" val="0"/>
-              </a:ext>
-            </a:extLst>
-          </a:blip>
-          <a:stretch>
-            <a:fillRect/>
-          </a:stretch>
-        </p:blipFill>
-        <p:spPr>
-          <a:xfrm>
-            <a:off x="225220" y="1270000"/>
-            <a:ext cx="2651990" cy="3894157"/>
-          </a:xfrm>
-          <a:prstGeom prst="rect">
-            <a:avLst/>
-          </a:prstGeom>
-        </p:spPr>
-      </p:pic>
-      <p:pic>
-        <p:nvPicPr>
-          <p:cNvPr id="6" name="Afbeelding 5"/>
-          <p:cNvPicPr>
-            <a:picLocks noChangeAspect="1"/>
-          </p:cNvPicPr>
-          <p:nvPr/>
-        </p:nvPicPr>
-        <p:blipFill rotWithShape="1">
-          <a:blip r:embed="rId4">
-            <a:extLst>
-              <a:ext uri="{28A0092B-C50C-407E-A947-70E740481C1C}">
-                <a14:useLocalDpi xmlns:a14="http://schemas.microsoft.com/office/drawing/2010/main" val="0"/>
-              </a:ext>
-            </a:extLst>
-          </a:blip>
-          <a:srcRect l="-687" t="72" r="2308" b="-72"/>
-          <a:stretch/>
-        </p:blipFill>
-        <p:spPr>
-          <a:xfrm>
-            <a:off x="4629999" y="1298575"/>
-            <a:ext cx="2609001" cy="4416425"/>
-          </a:xfrm>
-          <a:prstGeom prst="rect">
-            <a:avLst/>
-          </a:prstGeom>
-        </p:spPr>
-      </p:pic>
-      <p:pic>
-        <p:nvPicPr>
-          <p:cNvPr id="7" name="Afbeelding 6"/>
-          <p:cNvPicPr>
-            <a:picLocks noChangeAspect="1"/>
-          </p:cNvPicPr>
-          <p:nvPr/>
-        </p:nvPicPr>
-        <p:blipFill>
-          <a:blip r:embed="rId5">
-            <a:extLst>
-              <a:ext uri="{28A0092B-C50C-407E-A947-70E740481C1C}">
-                <a14:useLocalDpi xmlns:a14="http://schemas.microsoft.com/office/drawing/2010/main" val="0"/>
-              </a:ext>
-            </a:extLst>
-          </a:blip>
-          <a:stretch>
-            <a:fillRect/>
-          </a:stretch>
-        </p:blipFill>
-        <p:spPr>
-          <a:xfrm>
-            <a:off x="225220" y="1270000"/>
-            <a:ext cx="5681973" cy="5132538"/>
-          </a:xfrm>
-          <a:prstGeom prst="rect">
-            <a:avLst/>
-          </a:prstGeom>
-        </p:spPr>
-      </p:pic>
-      <p:pic>
-        <p:nvPicPr>
-          <p:cNvPr id="8" name="Afbeelding 7"/>
-          <p:cNvPicPr>
-            <a:picLocks noChangeAspect="1"/>
-          </p:cNvPicPr>
-          <p:nvPr/>
-        </p:nvPicPr>
-        <p:blipFill>
-          <a:blip r:embed="rId6">
-            <a:extLst>
-              <a:ext uri="{28A0092B-C50C-407E-A947-70E740481C1C}">
-                <a14:useLocalDpi xmlns:a14="http://schemas.microsoft.com/office/drawing/2010/main" val="0"/>
-              </a:ext>
-            </a:extLst>
-          </a:blip>
-          <a:stretch>
-            <a:fillRect/>
-          </a:stretch>
-        </p:blipFill>
-        <p:spPr>
-          <a:xfrm>
-            <a:off x="5907193" y="1270000"/>
-            <a:ext cx="3221467" cy="934623"/>
-          </a:xfrm>
-          <a:prstGeom prst="rect">
-            <a:avLst/>
-          </a:prstGeom>
-        </p:spPr>
-      </p:pic>
+        </p:nvSpPr>
+        <p:spPr/>
+        <p:txBody>
+          <a:bodyPr/>
+          <a:lstStyle/>
+          <a:p>
+            <a:endParaRPr lang="nl-NL"/>
+          </a:p>
+        </p:txBody>
+      </p:sp>
     </p:spTree>
     <p:extLst>
       <p:ext uri="{BB962C8B-B14F-4D97-AF65-F5344CB8AC3E}">
@@ -6949,248 +6585,6 @@
   <p:clrMapOvr>
     <a:masterClrMapping/>
   </p:clrMapOvr>
-  <p:timing>
-    <p:tnLst>
-      <p:par>
-        <p:cTn id="1" dur="indefinite" restart="never" nodeType="tmRoot">
-          <p:childTnLst>
-            <p:seq concurrent="1" nextAc="seek">
-              <p:cTn id="2" dur="indefinite" nodeType="mainSeq">
-                <p:childTnLst>
-                  <p:par>
-                    <p:cTn id="3" fill="hold">
-                      <p:stCondLst>
-                        <p:cond delay="indefinite"/>
-                      </p:stCondLst>
-                      <p:childTnLst>
-                        <p:par>
-                          <p:cTn id="4" fill="hold">
-                            <p:stCondLst>
-                              <p:cond delay="0"/>
-                            </p:stCondLst>
-                            <p:childTnLst>
-                              <p:par>
-                                <p:cTn id="5" presetID="10" presetClass="entr" presetSubtype="0" fill="hold" nodeType="clickEffect">
-                                  <p:stCondLst>
-                                    <p:cond delay="0"/>
-                                  </p:stCondLst>
-                                  <p:childTnLst>
-                                    <p:set>
-                                      <p:cBhvr>
-                                        <p:cTn id="6" dur="1" fill="hold">
-                                          <p:stCondLst>
-                                            <p:cond delay="0"/>
-                                          </p:stCondLst>
-                                        </p:cTn>
-                                        <p:tgtEl>
-                                          <p:spTgt spid="5"/>
-                                        </p:tgtEl>
-                                        <p:attrNameLst>
-                                          <p:attrName>style.visibility</p:attrName>
-                                        </p:attrNameLst>
-                                      </p:cBhvr>
-                                      <p:to>
-                                        <p:strVal val="visible"/>
-                                      </p:to>
-                                    </p:set>
-                                    <p:animEffect transition="in" filter="fade">
-                                      <p:cBhvr>
-                                        <p:cTn id="7" dur="500"/>
-                                        <p:tgtEl>
-                                          <p:spTgt spid="5"/>
-                                        </p:tgtEl>
-                                      </p:cBhvr>
-                                    </p:animEffect>
-                                  </p:childTnLst>
-                                </p:cTn>
-                              </p:par>
-                            </p:childTnLst>
-                          </p:cTn>
-                        </p:par>
-                      </p:childTnLst>
-                    </p:cTn>
-                  </p:par>
-                  <p:par>
-                    <p:cTn id="8" fill="hold">
-                      <p:stCondLst>
-                        <p:cond delay="indefinite"/>
-                      </p:stCondLst>
-                      <p:childTnLst>
-                        <p:par>
-                          <p:cTn id="9" fill="hold">
-                            <p:stCondLst>
-                              <p:cond delay="0"/>
-                            </p:stCondLst>
-                            <p:childTnLst>
-                              <p:par>
-                                <p:cTn id="10" presetID="10" presetClass="entr" presetSubtype="0" fill="hold" nodeType="clickEffect">
-                                  <p:stCondLst>
-                                    <p:cond delay="0"/>
-                                  </p:stCondLst>
-                                  <p:childTnLst>
-                                    <p:set>
-                                      <p:cBhvr>
-                                        <p:cTn id="11" dur="1" fill="hold">
-                                          <p:stCondLst>
-                                            <p:cond delay="0"/>
-                                          </p:stCondLst>
-                                        </p:cTn>
-                                        <p:tgtEl>
-                                          <p:spTgt spid="6"/>
-                                        </p:tgtEl>
-                                        <p:attrNameLst>
-                                          <p:attrName>style.visibility</p:attrName>
-                                        </p:attrNameLst>
-                                      </p:cBhvr>
-                                      <p:to>
-                                        <p:strVal val="visible"/>
-                                      </p:to>
-                                    </p:set>
-                                    <p:animEffect transition="in" filter="fade">
-                                      <p:cBhvr>
-                                        <p:cTn id="12" dur="500"/>
-                                        <p:tgtEl>
-                                          <p:spTgt spid="6"/>
-                                        </p:tgtEl>
-                                      </p:cBhvr>
-                                    </p:animEffect>
-                                  </p:childTnLst>
-                                </p:cTn>
-                              </p:par>
-                            </p:childTnLst>
-                          </p:cTn>
-                        </p:par>
-                      </p:childTnLst>
-                    </p:cTn>
-                  </p:par>
-                  <p:par>
-                    <p:cTn id="13" fill="hold">
-                      <p:stCondLst>
-                        <p:cond delay="indefinite"/>
-                      </p:stCondLst>
-                      <p:childTnLst>
-                        <p:par>
-                          <p:cTn id="14" fill="hold">
-                            <p:stCondLst>
-                              <p:cond delay="0"/>
-                            </p:stCondLst>
-                            <p:childTnLst>
-                              <p:par>
-                                <p:cTn id="15" presetID="10" presetClass="entr" presetSubtype="0" fill="hold" nodeType="clickEffect">
-                                  <p:stCondLst>
-                                    <p:cond delay="0"/>
-                                  </p:stCondLst>
-                                  <p:childTnLst>
-                                    <p:set>
-                                      <p:cBhvr>
-                                        <p:cTn id="16" dur="1" fill="hold">
-                                          <p:stCondLst>
-                                            <p:cond delay="0"/>
-                                          </p:stCondLst>
-                                        </p:cTn>
-                                        <p:tgtEl>
-                                          <p:spTgt spid="8"/>
-                                        </p:tgtEl>
-                                        <p:attrNameLst>
-                                          <p:attrName>style.visibility</p:attrName>
-                                        </p:attrNameLst>
-                                      </p:cBhvr>
-                                      <p:to>
-                                        <p:strVal val="visible"/>
-                                      </p:to>
-                                    </p:set>
-                                    <p:animEffect transition="in" filter="fade">
-                                      <p:cBhvr>
-                                        <p:cTn id="17" dur="500"/>
-                                        <p:tgtEl>
-                                          <p:spTgt spid="8"/>
-                                        </p:tgtEl>
-                                      </p:cBhvr>
-                                    </p:animEffect>
-                                  </p:childTnLst>
-                                </p:cTn>
-                              </p:par>
-                            </p:childTnLst>
-                          </p:cTn>
-                        </p:par>
-                      </p:childTnLst>
-                    </p:cTn>
-                  </p:par>
-                  <p:par>
-                    <p:cTn id="18" fill="hold">
-                      <p:stCondLst>
-                        <p:cond delay="indefinite"/>
-                      </p:stCondLst>
-                      <p:childTnLst>
-                        <p:par>
-                          <p:cTn id="19" fill="hold">
-                            <p:stCondLst>
-                              <p:cond delay="0"/>
-                            </p:stCondLst>
-                            <p:childTnLst>
-                              <p:par>
-                                <p:cTn id="20" presetID="10" presetClass="entr" presetSubtype="0" fill="hold" nodeType="clickEffect">
-                                  <p:stCondLst>
-                                    <p:cond delay="0"/>
-                                  </p:stCondLst>
-                                  <p:childTnLst>
-                                    <p:set>
-                                      <p:cBhvr>
-                                        <p:cTn id="21" dur="1" fill="hold">
-                                          <p:stCondLst>
-                                            <p:cond delay="0"/>
-                                          </p:stCondLst>
-                                        </p:cTn>
-                                        <p:tgtEl>
-                                          <p:spTgt spid="7"/>
-                                        </p:tgtEl>
-                                        <p:attrNameLst>
-                                          <p:attrName>style.visibility</p:attrName>
-                                        </p:attrNameLst>
-                                      </p:cBhvr>
-                                      <p:to>
-                                        <p:strVal val="visible"/>
-                                      </p:to>
-                                    </p:set>
-                                    <p:animEffect transition="in" filter="fade">
-                                      <p:cBhvr>
-                                        <p:cTn id="22" dur="500"/>
-                                        <p:tgtEl>
-                                          <p:spTgt spid="7"/>
-                                        </p:tgtEl>
-                                      </p:cBhvr>
-                                    </p:animEffect>
-                                  </p:childTnLst>
-                                </p:cTn>
-                              </p:par>
-                            </p:childTnLst>
-                          </p:cTn>
-                        </p:par>
-                      </p:childTnLst>
-                    </p:cTn>
-                  </p:par>
-                </p:childTnLst>
-              </p:cTn>
-              <p:prevCondLst>
-                <p:cond evt="onPrev" delay="0">
-                  <p:tgtEl>
-                    <p:sldTgt/>
-                  </p:tgtEl>
-                </p:cond>
-              </p:prevCondLst>
-              <p:nextCondLst>
-                <p:cond evt="onNext" delay="0">
-                  <p:tgtEl>
-                    <p:sldTgt/>
-                  </p:tgtEl>
-                </p:cond>
-              </p:nextCondLst>
-            </p:seq>
-          </p:childTnLst>
-        </p:cTn>
-      </p:par>
-    </p:tnLst>
-  </p:timing>
 </p:sld>
 </file>
 
@@ -7426,13 +6820,6 @@
   <p:clrMapOvr>
     <a:masterClrMapping/>
   </p:clrMapOvr>
-  <p:timing>
-    <p:tnLst>
-      <p:par>
-        <p:cTn id="1" dur="indefinite" restart="never" nodeType="tmRoot"/>
-      </p:par>
-    </p:tnLst>
-  </p:timing>
 </p:sld>
 </file>
 
@@ -7504,13 +6891,6 @@
   <p:clrMapOvr>
     <a:masterClrMapping/>
   </p:clrMapOvr>
-  <p:timing>
-    <p:tnLst>
-      <p:par>
-        <p:cTn id="1" dur="indefinite" restart="never" nodeType="tmRoot"/>
-      </p:par>
-    </p:tnLst>
-  </p:timing>
 </p:sld>
 </file>
 

</xml_diff>

<commit_message>
Revert "Revert "Jennifers deel presentatie toegevoegd""
This reverts commit 4b5318d8e42ef69c97a00950955469015e2aecc4.
</commit_message>
<xml_diff>
--- a/Project/Presentatie_En_UI/StartPresentatieXeroderma.pptx
+++ b/Project/Presentatie_En_UI/StartPresentatieXeroderma.pptx
@@ -6098,6 +6098,13 @@
   <p:clrMapOvr>
     <a:masterClrMapping/>
   </p:clrMapOvr>
+  <p:timing>
+    <p:tnLst>
+      <p:par>
+        <p:cTn id="1" dur="indefinite" restart="never" nodeType="tmRoot"/>
+      </p:par>
+    </p:tnLst>
+  </p:timing>
 </p:sld>
 </file>
 
@@ -6153,7 +6160,12 @@
             <p:ph idx="1"/>
           </p:nvPr>
         </p:nvSpPr>
-        <p:spPr/>
+        <p:spPr>
+          <a:xfrm>
+            <a:off x="762000" y="1524000"/>
+            <a:ext cx="7239000" cy="4724400"/>
+          </a:xfrm>
+        </p:spPr>
         <p:txBody>
           <a:bodyPr>
             <a:normAutofit fontScale="62500" lnSpcReduction="20000"/>
@@ -6241,8 +6253,26 @@
             </a:r>
             <a:r>
               <a:rPr lang="en-US" sz="2800" dirty="0"/>
-              <a:t>: User experience</a:t>
-            </a:r>
+              <a:t>: User </a:t>
+            </a:r>
+            <a:r>
+              <a:rPr lang="en-US" sz="2800" dirty="0" smtClean="0"/>
+              <a:t>experience</a:t>
+            </a:r>
+          </a:p>
+          <a:p>
+            <a:pPr>
+              <a:lnSpc>
+                <a:spcPct val="250000"/>
+              </a:lnSpc>
+              <a:buFont typeface="Wingdings" panose="05000000000000000000" pitchFamily="2" charset="2"/>
+              <a:buChar char="§"/>
+            </a:pPr>
+            <a:r>
+              <a:rPr lang="en-US" sz="2800" dirty="0" smtClean="0"/>
+              <a:t>Jennifer: Planning manager</a:t>
+            </a:r>
+            <a:endParaRPr lang="en-US" sz="2800" dirty="0"/>
           </a:p>
           <a:p>
             <a:endParaRPr lang="en-US" dirty="0"/>
@@ -6259,6 +6289,13 @@
   <p:clrMapOvr>
     <a:masterClrMapping/>
   </p:clrMapOvr>
+  <p:timing>
+    <p:tnLst>
+      <p:par>
+        <p:cTn id="1" dur="indefinite" restart="never" nodeType="tmRoot"/>
+      </p:par>
+    </p:tnLst>
+  </p:timing>
 </p:sld>
 </file>
 
@@ -6320,9 +6357,16 @@
             <p:ph idx="1"/>
           </p:nvPr>
         </p:nvSpPr>
-        <p:spPr/>
-        <p:txBody>
-          <a:bodyPr/>
+        <p:spPr>
+          <a:xfrm>
+            <a:off x="9144000" y="1270000"/>
+            <a:ext cx="3817503" cy="5410200"/>
+          </a:xfrm>
+        </p:spPr>
+        <p:txBody>
+          <a:bodyPr>
+            <a:normAutofit/>
+          </a:bodyPr>
           <a:lstStyle/>
           <a:p>
             <a:pPr marL="0" indent="0">
@@ -6346,20 +6390,12 @@
               <a:buNone/>
             </a:pPr>
             <a:r>
-              <a:rPr lang="nl-NL" dirty="0" err="1"/>
+              <a:rPr lang="nl-NL" dirty="0" err="1" smtClean="0"/>
               <a:t>Bloodborne</a:t>
             </a:r>
             <a:r>
-              <a:rPr lang="nl-NL" dirty="0"/>
+              <a:rPr lang="nl-NL" dirty="0" smtClean="0"/>
               <a:t>/AC </a:t>
-            </a:r>
-            <a:r>
-              <a:rPr lang="nl-NL" dirty="0" err="1"/>
-              <a:t>creed</a:t>
-            </a:r>
-            <a:r>
-              <a:rPr lang="nl-NL" dirty="0"/>
-              <a:t> </a:t>
             </a:r>
             <a:r>
               <a:rPr lang="nl-NL" dirty="0" err="1"/>
@@ -6372,12 +6408,197 @@
               <a:buNone/>
             </a:pPr>
             <a:r>
-              <a:rPr lang="nl-NL" dirty="0"/>
-              <a:t>1900</a:t>
-            </a:r>
-          </a:p>
-        </p:txBody>
-      </p:sp>
+              <a:rPr lang="nl-NL" dirty="0" smtClean="0"/>
+              <a:t>London rond 1850</a:t>
+            </a:r>
+          </a:p>
+          <a:p>
+            <a:pPr marL="0" indent="0">
+              <a:buNone/>
+            </a:pPr>
+            <a:r>
+              <a:rPr lang="en-US" dirty="0" smtClean="0"/>
+              <a:t>[</a:t>
+            </a:r>
+            <a:r>
+              <a:rPr lang="en-US" dirty="0" err="1" smtClean="0"/>
+              <a:t>Xeroderma</a:t>
+            </a:r>
+            <a:r>
+              <a:rPr lang="en-US" dirty="0" smtClean="0"/>
+              <a:t> is </a:t>
+            </a:r>
+            <a:r>
+              <a:rPr lang="en-US" dirty="0" err="1" smtClean="0"/>
+              <a:t>een</a:t>
+            </a:r>
+            <a:r>
+              <a:rPr lang="en-US" dirty="0" smtClean="0"/>
+              <a:t> 2.5D </a:t>
+            </a:r>
+            <a:r>
+              <a:rPr lang="en-US" dirty="0" err="1" smtClean="0"/>
+              <a:t>sidescrolling</a:t>
+            </a:r>
+            <a:r>
+              <a:rPr lang="en-US" dirty="0" smtClean="0"/>
+              <a:t> game </a:t>
+            </a:r>
+            <a:r>
+              <a:rPr lang="en-US" dirty="0" err="1" smtClean="0"/>
+              <a:t>dat</a:t>
+            </a:r>
+            <a:r>
+              <a:rPr lang="en-US" dirty="0" smtClean="0"/>
+              <a:t> </a:t>
+            </a:r>
+            <a:r>
+              <a:rPr lang="en-US" dirty="0" err="1" smtClean="0"/>
+              <a:t>zich</a:t>
+            </a:r>
+            <a:r>
+              <a:rPr lang="en-US" dirty="0" smtClean="0"/>
+              <a:t> </a:t>
+            </a:r>
+            <a:r>
+              <a:rPr lang="en-US" dirty="0" err="1" smtClean="0"/>
+              <a:t>afspeelt</a:t>
+            </a:r>
+            <a:r>
+              <a:rPr lang="en-US" dirty="0" smtClean="0"/>
+              <a:t> in </a:t>
+            </a:r>
+            <a:r>
+              <a:rPr lang="en-US" dirty="0" err="1" smtClean="0"/>
+              <a:t>stad</a:t>
+            </a:r>
+            <a:r>
+              <a:rPr lang="en-US" dirty="0" smtClean="0"/>
+              <a:t> London </a:t>
+            </a:r>
+            <a:r>
+              <a:rPr lang="en-US" dirty="0" err="1" smtClean="0"/>
+              <a:t>rond</a:t>
+            </a:r>
+            <a:r>
+              <a:rPr lang="en-US" dirty="0" smtClean="0"/>
+              <a:t> 1850. </a:t>
+            </a:r>
+            <a:endParaRPr lang="en-US" dirty="0"/>
+          </a:p>
+          <a:p>
+            <a:pPr marL="0" indent="0">
+              <a:buNone/>
+            </a:pPr>
+            <a:r>
+              <a:rPr lang="en-US" dirty="0" smtClean="0"/>
+              <a:t>In de game </a:t>
+            </a:r>
+            <a:r>
+              <a:rPr lang="en-US" dirty="0" err="1" smtClean="0"/>
+              <a:t>speel</a:t>
+            </a:r>
+            <a:r>
+              <a:rPr lang="en-US" dirty="0" smtClean="0"/>
+              <a:t> je </a:t>
+            </a:r>
+            <a:r>
+              <a:rPr lang="en-US" dirty="0" err="1" smtClean="0"/>
+              <a:t>als</a:t>
+            </a:r>
+            <a:r>
+              <a:rPr lang="en-US" dirty="0" smtClean="0"/>
+              <a:t> [Name] </a:t>
+            </a:r>
+            <a:br>
+              <a:rPr lang="en-US" dirty="0" smtClean="0"/>
+            </a:br>
+            <a:r>
+              <a:rPr lang="en-US" dirty="0" smtClean="0"/>
+              <a:t>die </a:t>
+            </a:r>
+            <a:r>
+              <a:rPr lang="en-US" dirty="0" err="1" smtClean="0"/>
+              <a:t>als</a:t>
+            </a:r>
+            <a:r>
+              <a:rPr lang="en-US" dirty="0" smtClean="0"/>
+              <a:t> </a:t>
+            </a:r>
+            <a:r>
+              <a:rPr lang="en-US" dirty="0" err="1" smtClean="0"/>
+              <a:t>levensbron</a:t>
+            </a:r>
+            <a:r>
+              <a:rPr lang="en-US" dirty="0" smtClean="0"/>
+              <a:t> </a:t>
+            </a:r>
+            <a:r>
+              <a:rPr lang="en-US" dirty="0" err="1" smtClean="0"/>
+              <a:t>bloed</a:t>
+            </a:r>
+            <a:r>
+              <a:rPr lang="en-US" dirty="0" smtClean="0"/>
+              <a:t> </a:t>
+            </a:r>
+            <a:r>
+              <a:rPr lang="en-US" dirty="0" err="1" smtClean="0"/>
+              <a:t>gebruikt</a:t>
+            </a:r>
+            <a:r>
+              <a:rPr lang="en-US" dirty="0" smtClean="0"/>
+              <a:t>.]</a:t>
+            </a:r>
+          </a:p>
+          <a:p>
+            <a:pPr marL="0" indent="0">
+              <a:buNone/>
+            </a:pPr>
+            <a:endParaRPr lang="en-US" dirty="0" smtClean="0"/>
+          </a:p>
+        </p:txBody>
+      </p:sp>
+      <p:pic>
+        <p:nvPicPr>
+          <p:cNvPr id="1028" name="Picture 4" descr="Afbeeldingsresultaat voor london 1850"/>
+          <p:cNvPicPr>
+            <a:picLocks noChangeAspect="1" noChangeArrowheads="1"/>
+          </p:cNvPicPr>
+          <p:nvPr/>
+        </p:nvPicPr>
+        <p:blipFill>
+          <a:blip r:embed="rId2">
+            <a:extLst>
+              <a:ext uri="{28A0092B-C50C-407E-A947-70E740481C1C}">
+                <a14:useLocalDpi xmlns:a14="http://schemas.microsoft.com/office/drawing/2010/main" val="0"/>
+              </a:ext>
+            </a:extLst>
+          </a:blip>
+          <a:srcRect/>
+          <a:stretch>
+            <a:fillRect/>
+          </a:stretch>
+        </p:blipFill>
+        <p:spPr bwMode="auto">
+          <a:xfrm>
+            <a:off x="304800" y="1466850"/>
+            <a:ext cx="6775006" cy="4340771"/>
+          </a:xfrm>
+          <a:prstGeom prst="rect">
+            <a:avLst/>
+          </a:prstGeom>
+          <a:noFill/>
+          <a:extLst>
+            <a:ext uri="{909E8E84-426E-40DD-AFC4-6F175D3DCCD1}">
+              <a14:hiddenFill xmlns:a14="http://schemas.microsoft.com/office/drawing/2010/main">
+                <a:solidFill>
+                  <a:srgbClr val="FFFFFF"/>
+                </a:solidFill>
+              </a14:hiddenFill>
+            </a:ext>
+          </a:extLst>
+        </p:spPr>
+      </p:pic>
     </p:spTree>
     <p:extLst>
       <p:ext uri="{BB962C8B-B14F-4D97-AF65-F5344CB8AC3E}">
@@ -6388,6 +6609,13 @@
   <p:clrMapOvr>
     <a:masterClrMapping/>
   </p:clrMapOvr>
+  <p:timing>
+    <p:tnLst>
+      <p:par>
+        <p:cTn id="1" dur="indefinite" restart="never" nodeType="tmRoot"/>
+      </p:par>
+    </p:tnLst>
+  </p:timing>
 </p:sld>
 </file>
 
@@ -6514,6 +6742,13 @@
   <p:clrMapOvr>
     <a:masterClrMapping/>
   </p:clrMapOvr>
+  <p:timing>
+    <p:tnLst>
+      <p:par>
+        <p:cTn id="1" dur="indefinite" restart="never" nodeType="tmRoot"/>
+      </p:par>
+    </p:tnLst>
+  </p:timing>
 </p:sld>
 </file>
 
@@ -6556,25 +6791,154 @@
           </a:p>
         </p:txBody>
       </p:sp>
-      <p:sp>
-        <p:nvSpPr>
-          <p:cNvPr id="3" name="Tijdelijke aanduiding voor inhoud 2"/>
-          <p:cNvSpPr>
-            <a:spLocks noGrp="1"/>
-          </p:cNvSpPr>
+      <p:pic>
+        <p:nvPicPr>
+          <p:cNvPr id="4" name="Tijdelijke aanduiding voor inhoud 3"/>
+          <p:cNvPicPr>
+            <a:picLocks noGrp="1" noChangeAspect="1"/>
+          </p:cNvPicPr>
           <p:nvPr>
             <p:ph idx="1"/>
           </p:nvPr>
-        </p:nvSpPr>
-        <p:spPr/>
-        <p:txBody>
-          <a:bodyPr/>
-          <a:lstStyle/>
-          <a:p>
-            <a:endParaRPr lang="nl-NL"/>
-          </a:p>
-        </p:txBody>
-      </p:sp>
+        </p:nvPicPr>
+        <p:blipFill>
+          <a:blip r:embed="rId2" cstate="print">
+            <a:extLst>
+              <a:ext uri="{28A0092B-C50C-407E-A947-70E740481C1C}">
+                <a14:useLocalDpi xmlns:a14="http://schemas.microsoft.com/office/drawing/2010/main" val="0"/>
+              </a:ext>
+            </a:extLst>
+          </a:blip>
+          <a:stretch>
+            <a:fillRect/>
+          </a:stretch>
+        </p:blipFill>
+        <p:spPr>
+          <a:xfrm>
+            <a:off x="225220" y="1270000"/>
+            <a:ext cx="8809558" cy="4148138"/>
+          </a:xfrm>
+        </p:spPr>
+      </p:pic>
+      <p:pic>
+        <p:nvPicPr>
+          <p:cNvPr id="5" name="Afbeelding 4"/>
+          <p:cNvPicPr>
+            <a:picLocks noChangeAspect="1"/>
+          </p:cNvPicPr>
+          <p:nvPr/>
+        </p:nvPicPr>
+        <p:blipFill>
+          <a:blip r:embed="rId3">
+            <a:extLst>
+              <a:ext uri="{28A0092B-C50C-407E-A947-70E740481C1C}">
+                <a14:useLocalDpi xmlns:a14="http://schemas.microsoft.com/office/drawing/2010/main" val="0"/>
+              </a:ext>
+            </a:extLst>
+          </a:blip>
+          <a:stretch>
+            <a:fillRect/>
+          </a:stretch>
+        </p:blipFill>
+        <p:spPr>
+          <a:xfrm>
+            <a:off x="225220" y="1270000"/>
+            <a:ext cx="2651990" cy="3894157"/>
+          </a:xfrm>
+          <a:prstGeom prst="rect">
+            <a:avLst/>
+          </a:prstGeom>
+        </p:spPr>
+      </p:pic>
+      <p:pic>
+        <p:nvPicPr>
+          <p:cNvPr id="6" name="Afbeelding 5"/>
+          <p:cNvPicPr>
+            <a:picLocks noChangeAspect="1"/>
+          </p:cNvPicPr>
+          <p:nvPr/>
+        </p:nvPicPr>
+        <p:blipFill rotWithShape="1">
+          <a:blip r:embed="rId4">
+            <a:extLst>
+              <a:ext uri="{28A0092B-C50C-407E-A947-70E740481C1C}">
+                <a14:useLocalDpi xmlns:a14="http://schemas.microsoft.com/office/drawing/2010/main" val="0"/>
+              </a:ext>
+            </a:extLst>
+          </a:blip>
+          <a:srcRect l="-687" t="72" r="2308" b="-72"/>
+          <a:stretch/>
+        </p:blipFill>
+        <p:spPr>
+          <a:xfrm>
+            <a:off x="4629999" y="1298575"/>
+            <a:ext cx="2609001" cy="4416425"/>
+          </a:xfrm>
+          <a:prstGeom prst="rect">
+            <a:avLst/>
+          </a:prstGeom>
+        </p:spPr>
+      </p:pic>
+      <p:pic>
+        <p:nvPicPr>
+          <p:cNvPr id="7" name="Afbeelding 6"/>
+          <p:cNvPicPr>
+            <a:picLocks noChangeAspect="1"/>
+          </p:cNvPicPr>
+          <p:nvPr/>
+        </p:nvPicPr>
+        <p:blipFill>
+          <a:blip r:embed="rId5">
+            <a:extLst>
+              <a:ext uri="{28A0092B-C50C-407E-A947-70E740481C1C}">
+                <a14:useLocalDpi xmlns:a14="http://schemas.microsoft.com/office/drawing/2010/main" val="0"/>
+              </a:ext>
+            </a:extLst>
+          </a:blip>
+          <a:stretch>
+            <a:fillRect/>
+          </a:stretch>
+        </p:blipFill>
+        <p:spPr>
+          <a:xfrm>
+            <a:off x="225220" y="1270000"/>
+            <a:ext cx="5681973" cy="5132538"/>
+          </a:xfrm>
+          <a:prstGeom prst="rect">
+            <a:avLst/>
+          </a:prstGeom>
+        </p:spPr>
+      </p:pic>
+      <p:pic>
+        <p:nvPicPr>
+          <p:cNvPr id="8" name="Afbeelding 7"/>
+          <p:cNvPicPr>
+            <a:picLocks noChangeAspect="1"/>
+          </p:cNvPicPr>
+          <p:nvPr/>
+        </p:nvPicPr>
+        <p:blipFill>
+          <a:blip r:embed="rId6">
+            <a:extLst>
+              <a:ext uri="{28A0092B-C50C-407E-A947-70E740481C1C}">
+                <a14:useLocalDpi xmlns:a14="http://schemas.microsoft.com/office/drawing/2010/main" val="0"/>
+              </a:ext>
+            </a:extLst>
+          </a:blip>
+          <a:stretch>
+            <a:fillRect/>
+          </a:stretch>
+        </p:blipFill>
+        <p:spPr>
+          <a:xfrm>
+            <a:off x="5907193" y="1270000"/>
+            <a:ext cx="3221467" cy="934623"/>
+          </a:xfrm>
+          <a:prstGeom prst="rect">
+            <a:avLst/>
+          </a:prstGeom>
+        </p:spPr>
+      </p:pic>
     </p:spTree>
     <p:extLst>
       <p:ext uri="{BB962C8B-B14F-4D97-AF65-F5344CB8AC3E}">
@@ -6585,6 +6949,248 @@
   <p:clrMapOvr>
     <a:masterClrMapping/>
   </p:clrMapOvr>
+  <p:timing>
+    <p:tnLst>
+      <p:par>
+        <p:cTn id="1" dur="indefinite" restart="never" nodeType="tmRoot">
+          <p:childTnLst>
+            <p:seq concurrent="1" nextAc="seek">
+              <p:cTn id="2" dur="indefinite" nodeType="mainSeq">
+                <p:childTnLst>
+                  <p:par>
+                    <p:cTn id="3" fill="hold">
+                      <p:stCondLst>
+                        <p:cond delay="indefinite"/>
+                      </p:stCondLst>
+                      <p:childTnLst>
+                        <p:par>
+                          <p:cTn id="4" fill="hold">
+                            <p:stCondLst>
+                              <p:cond delay="0"/>
+                            </p:stCondLst>
+                            <p:childTnLst>
+                              <p:par>
+                                <p:cTn id="5" presetID="10" presetClass="entr" presetSubtype="0" fill="hold" nodeType="clickEffect">
+                                  <p:stCondLst>
+                                    <p:cond delay="0"/>
+                                  </p:stCondLst>
+                                  <p:childTnLst>
+                                    <p:set>
+                                      <p:cBhvr>
+                                        <p:cTn id="6" dur="1" fill="hold">
+                                          <p:stCondLst>
+                                            <p:cond delay="0"/>
+                                          </p:stCondLst>
+                                        </p:cTn>
+                                        <p:tgtEl>
+                                          <p:spTgt spid="5"/>
+                                        </p:tgtEl>
+                                        <p:attrNameLst>
+                                          <p:attrName>style.visibility</p:attrName>
+                                        </p:attrNameLst>
+                                      </p:cBhvr>
+                                      <p:to>
+                                        <p:strVal val="visible"/>
+                                      </p:to>
+                                    </p:set>
+                                    <p:animEffect transition="in" filter="fade">
+                                      <p:cBhvr>
+                                        <p:cTn id="7" dur="500"/>
+                                        <p:tgtEl>
+                                          <p:spTgt spid="5"/>
+                                        </p:tgtEl>
+                                      </p:cBhvr>
+                                    </p:animEffect>
+                                  </p:childTnLst>
+                                </p:cTn>
+                              </p:par>
+                            </p:childTnLst>
+                          </p:cTn>
+                        </p:par>
+                      </p:childTnLst>
+                    </p:cTn>
+                  </p:par>
+                  <p:par>
+                    <p:cTn id="8" fill="hold">
+                      <p:stCondLst>
+                        <p:cond delay="indefinite"/>
+                      </p:stCondLst>
+                      <p:childTnLst>
+                        <p:par>
+                          <p:cTn id="9" fill="hold">
+                            <p:stCondLst>
+                              <p:cond delay="0"/>
+                            </p:stCondLst>
+                            <p:childTnLst>
+                              <p:par>
+                                <p:cTn id="10" presetID="10" presetClass="entr" presetSubtype="0" fill="hold" nodeType="clickEffect">
+                                  <p:stCondLst>
+                                    <p:cond delay="0"/>
+                                  </p:stCondLst>
+                                  <p:childTnLst>
+                                    <p:set>
+                                      <p:cBhvr>
+                                        <p:cTn id="11" dur="1" fill="hold">
+                                          <p:stCondLst>
+                                            <p:cond delay="0"/>
+                                          </p:stCondLst>
+                                        </p:cTn>
+                                        <p:tgtEl>
+                                          <p:spTgt spid="6"/>
+                                        </p:tgtEl>
+                                        <p:attrNameLst>
+                                          <p:attrName>style.visibility</p:attrName>
+                                        </p:attrNameLst>
+                                      </p:cBhvr>
+                                      <p:to>
+                                        <p:strVal val="visible"/>
+                                      </p:to>
+                                    </p:set>
+                                    <p:animEffect transition="in" filter="fade">
+                                      <p:cBhvr>
+                                        <p:cTn id="12" dur="500"/>
+                                        <p:tgtEl>
+                                          <p:spTgt spid="6"/>
+                                        </p:tgtEl>
+                                      </p:cBhvr>
+                                    </p:animEffect>
+                                  </p:childTnLst>
+                                </p:cTn>
+                              </p:par>
+                            </p:childTnLst>
+                          </p:cTn>
+                        </p:par>
+                      </p:childTnLst>
+                    </p:cTn>
+                  </p:par>
+                  <p:par>
+                    <p:cTn id="13" fill="hold">
+                      <p:stCondLst>
+                        <p:cond delay="indefinite"/>
+                      </p:stCondLst>
+                      <p:childTnLst>
+                        <p:par>
+                          <p:cTn id="14" fill="hold">
+                            <p:stCondLst>
+                              <p:cond delay="0"/>
+                            </p:stCondLst>
+                            <p:childTnLst>
+                              <p:par>
+                                <p:cTn id="15" presetID="10" presetClass="entr" presetSubtype="0" fill="hold" nodeType="clickEffect">
+                                  <p:stCondLst>
+                                    <p:cond delay="0"/>
+                                  </p:stCondLst>
+                                  <p:childTnLst>
+                                    <p:set>
+                                      <p:cBhvr>
+                                        <p:cTn id="16" dur="1" fill="hold">
+                                          <p:stCondLst>
+                                            <p:cond delay="0"/>
+                                          </p:stCondLst>
+                                        </p:cTn>
+                                        <p:tgtEl>
+                                          <p:spTgt spid="8"/>
+                                        </p:tgtEl>
+                                        <p:attrNameLst>
+                                          <p:attrName>style.visibility</p:attrName>
+                                        </p:attrNameLst>
+                                      </p:cBhvr>
+                                      <p:to>
+                                        <p:strVal val="visible"/>
+                                      </p:to>
+                                    </p:set>
+                                    <p:animEffect transition="in" filter="fade">
+                                      <p:cBhvr>
+                                        <p:cTn id="17" dur="500"/>
+                                        <p:tgtEl>
+                                          <p:spTgt spid="8"/>
+                                        </p:tgtEl>
+                                      </p:cBhvr>
+                                    </p:animEffect>
+                                  </p:childTnLst>
+                                </p:cTn>
+                              </p:par>
+                            </p:childTnLst>
+                          </p:cTn>
+                        </p:par>
+                      </p:childTnLst>
+                    </p:cTn>
+                  </p:par>
+                  <p:par>
+                    <p:cTn id="18" fill="hold">
+                      <p:stCondLst>
+                        <p:cond delay="indefinite"/>
+                      </p:stCondLst>
+                      <p:childTnLst>
+                        <p:par>
+                          <p:cTn id="19" fill="hold">
+                            <p:stCondLst>
+                              <p:cond delay="0"/>
+                            </p:stCondLst>
+                            <p:childTnLst>
+                              <p:par>
+                                <p:cTn id="20" presetID="10" presetClass="entr" presetSubtype="0" fill="hold" nodeType="clickEffect">
+                                  <p:stCondLst>
+                                    <p:cond delay="0"/>
+                                  </p:stCondLst>
+                                  <p:childTnLst>
+                                    <p:set>
+                                      <p:cBhvr>
+                                        <p:cTn id="21" dur="1" fill="hold">
+                                          <p:stCondLst>
+                                            <p:cond delay="0"/>
+                                          </p:stCondLst>
+                                        </p:cTn>
+                                        <p:tgtEl>
+                                          <p:spTgt spid="7"/>
+                                        </p:tgtEl>
+                                        <p:attrNameLst>
+                                          <p:attrName>style.visibility</p:attrName>
+                                        </p:attrNameLst>
+                                      </p:cBhvr>
+                                      <p:to>
+                                        <p:strVal val="visible"/>
+                                      </p:to>
+                                    </p:set>
+                                    <p:animEffect transition="in" filter="fade">
+                                      <p:cBhvr>
+                                        <p:cTn id="22" dur="500"/>
+                                        <p:tgtEl>
+                                          <p:spTgt spid="7"/>
+                                        </p:tgtEl>
+                                      </p:cBhvr>
+                                    </p:animEffect>
+                                  </p:childTnLst>
+                                </p:cTn>
+                              </p:par>
+                            </p:childTnLst>
+                          </p:cTn>
+                        </p:par>
+                      </p:childTnLst>
+                    </p:cTn>
+                  </p:par>
+                </p:childTnLst>
+              </p:cTn>
+              <p:prevCondLst>
+                <p:cond evt="onPrev" delay="0">
+                  <p:tgtEl>
+                    <p:sldTgt/>
+                  </p:tgtEl>
+                </p:cond>
+              </p:prevCondLst>
+              <p:nextCondLst>
+                <p:cond evt="onNext" delay="0">
+                  <p:tgtEl>
+                    <p:sldTgt/>
+                  </p:tgtEl>
+                </p:cond>
+              </p:nextCondLst>
+            </p:seq>
+          </p:childTnLst>
+        </p:cTn>
+      </p:par>
+    </p:tnLst>
+  </p:timing>
 </p:sld>
 </file>
 
@@ -6820,6 +7426,13 @@
   <p:clrMapOvr>
     <a:masterClrMapping/>
   </p:clrMapOvr>
+  <p:timing>
+    <p:tnLst>
+      <p:par>
+        <p:cTn id="1" dur="indefinite" restart="never" nodeType="tmRoot"/>
+      </p:par>
+    </p:tnLst>
+  </p:timing>
 </p:sld>
 </file>
 
@@ -6891,6 +7504,13 @@
   <p:clrMapOvr>
     <a:masterClrMapping/>
   </p:clrMapOvr>
+  <p:timing>
+    <p:tnLst>
+      <p:par>
+        <p:cTn id="1" dur="indefinite" restart="never" nodeType="tmRoot"/>
+      </p:par>
+    </p:tnLst>
+  </p:timing>
 </p:sld>
 </file>
 

</xml_diff>